<commit_message>
add plots to presentation
</commit_message>
<xml_diff>
--- a/presentations/levy_presentation.pptx
+++ b/presentations/levy_presentation.pptx
@@ -6,10 +6,10 @@
     <p:sldMasterId id="2147483663" r:id="rId2"/>
   </p:sldMasterIdLst>
   <p:notesMasterIdLst>
-    <p:notesMasterId r:id="rId21"/>
+    <p:notesMasterId r:id="rId23"/>
   </p:notesMasterIdLst>
   <p:handoutMasterIdLst>
-    <p:handoutMasterId r:id="rId22"/>
+    <p:handoutMasterId r:id="rId24"/>
   </p:handoutMasterIdLst>
   <p:sldIdLst>
     <p:sldId id="256" r:id="rId3"/>
@@ -20,16 +20,18 @@
     <p:sldId id="261" r:id="rId8"/>
     <p:sldId id="262" r:id="rId9"/>
     <p:sldId id="263" r:id="rId10"/>
-    <p:sldId id="264" r:id="rId11"/>
-    <p:sldId id="265" r:id="rId12"/>
-    <p:sldId id="273" r:id="rId13"/>
-    <p:sldId id="274" r:id="rId14"/>
-    <p:sldId id="267" r:id="rId15"/>
-    <p:sldId id="268" r:id="rId16"/>
-    <p:sldId id="270" r:id="rId17"/>
-    <p:sldId id="269" r:id="rId18"/>
-    <p:sldId id="271" r:id="rId19"/>
-    <p:sldId id="272" r:id="rId20"/>
+    <p:sldId id="276" r:id="rId11"/>
+    <p:sldId id="264" r:id="rId12"/>
+    <p:sldId id="265" r:id="rId13"/>
+    <p:sldId id="273" r:id="rId14"/>
+    <p:sldId id="274" r:id="rId15"/>
+    <p:sldId id="267" r:id="rId16"/>
+    <p:sldId id="275" r:id="rId17"/>
+    <p:sldId id="268" r:id="rId18"/>
+    <p:sldId id="270" r:id="rId19"/>
+    <p:sldId id="269" r:id="rId20"/>
+    <p:sldId id="271" r:id="rId21"/>
+    <p:sldId id="272" r:id="rId22"/>
   </p:sldIdLst>
   <p:sldSz cx="8640763" cy="6480175"/>
   <p:notesSz cx="6794500" cy="9918700"/>
@@ -8206,7 +8208,7 @@
           <p:cNvPr id="2" name="Title 1">
             <a:extLst>
               <a:ext uri="{FF2B5EF4-FFF2-40B4-BE49-F238E27FC236}">
-                <a16:creationId xmlns:a16="http://schemas.microsoft.com/office/drawing/2014/main" id="{55F718FC-F914-47AE-8321-2E443A41B361}"/>
+                <a16:creationId xmlns:a16="http://schemas.microsoft.com/office/drawing/2014/main" id="{366B0929-4D63-4935-BC68-DCEE86A5F21C}"/>
               </a:ext>
             </a:extLst>
           </p:cNvPr>
@@ -8226,7 +8228,10 @@
               <a:rPr lang="en-GB" dirty="0" err="1"/>
               <a:t>Ergebnisse</a:t>
             </a:r>
-            <a:endParaRPr lang="en-GB" dirty="0"/>
+            <a:r>
+              <a:rPr lang="en-GB" dirty="0"/>
+              <a:t> </a:t>
+            </a:r>
           </a:p>
         </p:txBody>
       </p:sp>
@@ -8235,7 +8240,7 @@
           <p:cNvPr id="4" name="Slide Number Placeholder 3">
             <a:extLst>
               <a:ext uri="{FF2B5EF4-FFF2-40B4-BE49-F238E27FC236}">
-                <a16:creationId xmlns:a16="http://schemas.microsoft.com/office/drawing/2014/main" id="{47F60390-EFB0-48AB-8A1D-0DBC3CB3839E}"/>
+                <a16:creationId xmlns:a16="http://schemas.microsoft.com/office/drawing/2014/main" id="{507D79C0-B13A-4F87-AD41-A3FA70F2F4C9}"/>
               </a:ext>
             </a:extLst>
           </p:cNvPr>
@@ -8260,6 +8265,167 @@
                 <a:defRPr/>
               </a:pPr>
               <a:t>10</a:t>
+            </a:fld>
+            <a:endParaRPr lang="de-DE" altLang="de-DE" dirty="0"/>
+          </a:p>
+        </p:txBody>
+      </p:sp>
+      <p:sp>
+        <p:nvSpPr>
+          <p:cNvPr id="5" name="Footer Placeholder 4">
+            <a:extLst>
+              <a:ext uri="{FF2B5EF4-FFF2-40B4-BE49-F238E27FC236}">
+                <a16:creationId xmlns:a16="http://schemas.microsoft.com/office/drawing/2014/main" id="{52446E38-697D-4461-B232-3CD9B85209A9}"/>
+              </a:ext>
+            </a:extLst>
+          </p:cNvPr>
+          <p:cNvSpPr>
+            <a:spLocks noGrp="1"/>
+          </p:cNvSpPr>
+          <p:nvPr>
+            <p:ph type="ftr" sz="quarter" idx="11"/>
+          </p:nvPr>
+        </p:nvSpPr>
+        <p:spPr/>
+        <p:txBody>
+          <a:bodyPr/>
+          <a:lstStyle/>
+          <a:p>
+            <a:pPr>
+              <a:defRPr/>
+            </a:pPr>
+            <a:r>
+              <a:rPr lang="de-DE"/>
+              <a:t>Template Matching - Sven Lesche</a:t>
+            </a:r>
+            <a:endParaRPr lang="de-DE" dirty="0"/>
+          </a:p>
+        </p:txBody>
+      </p:sp>
+      <p:pic>
+        <p:nvPicPr>
+          <p:cNvPr id="10" name="Content Placeholder 9">
+            <a:extLst>
+              <a:ext uri="{FF2B5EF4-FFF2-40B4-BE49-F238E27FC236}">
+                <a16:creationId xmlns:a16="http://schemas.microsoft.com/office/drawing/2014/main" id="{7AD23912-C7E9-4B57-B56A-96214EE9CC3E}"/>
+              </a:ext>
+            </a:extLst>
+          </p:cNvPr>
+          <p:cNvPicPr>
+            <a:picLocks noGrp="1" noChangeAspect="1"/>
+          </p:cNvPicPr>
+          <p:nvPr>
+            <p:ph idx="1"/>
+          </p:nvPr>
+        </p:nvPicPr>
+        <p:blipFill>
+          <a:blip r:embed="rId2">
+            <a:extLst>
+              <a:ext uri="{28A0092B-C50C-407E-A947-70E740481C1C}">
+                <a14:useLocalDpi xmlns:a14="http://schemas.microsoft.com/office/drawing/2010/main" val="0"/>
+              </a:ext>
+            </a:extLst>
+          </a:blip>
+          <a:stretch>
+            <a:fillRect/>
+          </a:stretch>
+        </p:blipFill>
+        <p:spPr>
+          <a:xfrm>
+            <a:off x="215900" y="1845022"/>
+            <a:ext cx="8207375" cy="3942656"/>
+          </a:xfrm>
+        </p:spPr>
+      </p:pic>
+    </p:spTree>
+    <p:extLst>
+      <p:ext uri="{BB962C8B-B14F-4D97-AF65-F5344CB8AC3E}">
+        <p14:creationId xmlns:p14="http://schemas.microsoft.com/office/powerpoint/2010/main" val="238607183"/>
+      </p:ext>
+    </p:extLst>
+  </p:cSld>
+  <p:clrMapOvr>
+    <a:masterClrMapping/>
+  </p:clrMapOvr>
+</p:sld>
+</file>
+
+<file path=ppt/slides/slide11.xml><?xml version="1.0" encoding="utf-8"?>
+<p:sld xmlns:a="http://schemas.openxmlformats.org/drawingml/2006/main" xmlns:r="http://schemas.openxmlformats.org/officeDocument/2006/relationships" xmlns:p="http://schemas.openxmlformats.org/presentationml/2006/main">
+  <p:cSld>
+    <p:spTree>
+      <p:nvGrpSpPr>
+        <p:cNvPr id="1" name=""/>
+        <p:cNvGrpSpPr/>
+        <p:nvPr/>
+      </p:nvGrpSpPr>
+      <p:grpSpPr>
+        <a:xfrm>
+          <a:off x="0" y="0"/>
+          <a:ext cx="0" cy="0"/>
+          <a:chOff x="0" y="0"/>
+          <a:chExt cx="0" cy="0"/>
+        </a:xfrm>
+      </p:grpSpPr>
+      <p:sp>
+        <p:nvSpPr>
+          <p:cNvPr id="2" name="Title 1">
+            <a:extLst>
+              <a:ext uri="{FF2B5EF4-FFF2-40B4-BE49-F238E27FC236}">
+                <a16:creationId xmlns:a16="http://schemas.microsoft.com/office/drawing/2014/main" id="{55F718FC-F914-47AE-8321-2E443A41B361}"/>
+              </a:ext>
+            </a:extLst>
+          </p:cNvPr>
+          <p:cNvSpPr>
+            <a:spLocks noGrp="1"/>
+          </p:cNvSpPr>
+          <p:nvPr>
+            <p:ph type="title"/>
+          </p:nvPr>
+        </p:nvSpPr>
+        <p:spPr/>
+        <p:txBody>
+          <a:bodyPr/>
+          <a:lstStyle/>
+          <a:p>
+            <a:r>
+              <a:rPr lang="en-GB" dirty="0" err="1"/>
+              <a:t>Ergebnisse</a:t>
+            </a:r>
+            <a:endParaRPr lang="en-GB" dirty="0"/>
+          </a:p>
+        </p:txBody>
+      </p:sp>
+      <p:sp>
+        <p:nvSpPr>
+          <p:cNvPr id="4" name="Slide Number Placeholder 3">
+            <a:extLst>
+              <a:ext uri="{FF2B5EF4-FFF2-40B4-BE49-F238E27FC236}">
+                <a16:creationId xmlns:a16="http://schemas.microsoft.com/office/drawing/2014/main" id="{47F60390-EFB0-48AB-8A1D-0DBC3CB3839E}"/>
+              </a:ext>
+            </a:extLst>
+          </p:cNvPr>
+          <p:cNvSpPr>
+            <a:spLocks noGrp="1"/>
+          </p:cNvSpPr>
+          <p:nvPr>
+            <p:ph type="sldNum" sz="quarter" idx="10"/>
+          </p:nvPr>
+        </p:nvSpPr>
+        <p:spPr/>
+        <p:txBody>
+          <a:bodyPr/>
+          <a:lstStyle/>
+          <a:p>
+            <a:pPr>
+              <a:defRPr/>
+            </a:pPr>
+            <a:fld id="{BFD7839F-DA5C-4C13-94BA-0DC1947AAA90}" type="slidenum">
+              <a:rPr lang="de-DE" altLang="de-DE" smtClean="0"/>
+              <a:pPr>
+                <a:defRPr/>
+              </a:pPr>
+              <a:t>11</a:t>
             </a:fld>
             <a:endParaRPr lang="de-DE" altLang="de-DE" dirty="0"/>
           </a:p>
@@ -8444,8 +8610,8 @@
         </p:blipFill>
         <p:spPr>
           <a:xfrm>
-            <a:off x="664473" y="1662314"/>
-            <a:ext cx="7311816" cy="3779141"/>
+            <a:off x="442938" y="1547814"/>
+            <a:ext cx="7533351" cy="3893642"/>
           </a:xfrm>
         </p:spPr>
       </p:pic>
@@ -8462,7 +8628,7 @@
 </p:sld>
 </file>
 
-<file path=ppt/slides/slide11.xml><?xml version="1.0" encoding="utf-8"?>
+<file path=ppt/slides/slide12.xml><?xml version="1.0" encoding="utf-8"?>
 <p:sld xmlns:a="http://schemas.openxmlformats.org/drawingml/2006/main" xmlns:r="http://schemas.openxmlformats.org/officeDocument/2006/relationships" xmlns:p="http://schemas.openxmlformats.org/presentationml/2006/main">
   <p:cSld>
     <p:spTree>
@@ -8537,7 +8703,7 @@
               <a:pPr>
                 <a:defRPr/>
               </a:pPr>
-              <a:t>11</a:t>
+              <a:t>12</a:t>
             </a:fld>
             <a:endParaRPr lang="de-DE" altLang="de-DE" dirty="0"/>
           </a:p>
@@ -8634,7 +8800,7 @@
                 </a:r>
                 <a:r>
                   <a:rPr lang="en-GB" dirty="0"/>
-                  <a:t>33.39</a:t>
+                  <a:t>73.59</a:t>
                 </a:r>
                 <a:r>
                   <a:rPr lang="el-GR" dirty="0"/>
@@ -8642,276 +8808,7 @@
                 </a:r>
                 <a:r>
                   <a:rPr lang="en-GB" dirty="0"/>
-                  <a:t>p &lt; .0001, CFI = 0.90, RMSEA = 0.08</a:t>
-                </a:r>
-              </a:p>
-            </p:txBody>
-          </p:sp>
-        </mc:Choice>
-        <mc:Fallback>
-          <p:sp>
-            <p:nvSpPr>
-              <p:cNvPr id="8" name="TextBox 7">
-                <a:extLst>
-                  <a:ext uri="{FF2B5EF4-FFF2-40B4-BE49-F238E27FC236}">
-                    <a16:creationId xmlns:a16="http://schemas.microsoft.com/office/drawing/2014/main" id="{7837F6F1-44F6-4972-BB94-F25988537A8E}"/>
-                  </a:ext>
-                </a:extLst>
-              </p:cNvPr>
-              <p:cNvSpPr txBox="1">
-                <a:spLocks noRot="1" noChangeAspect="1" noMove="1" noResize="1" noEditPoints="1" noAdjustHandles="1" noChangeArrowheads="1" noChangeShapeType="1" noTextEdit="1"/>
-              </p:cNvSpPr>
-              <p:nvPr/>
-            </p:nvSpPr>
-            <p:spPr>
-              <a:xfrm>
-                <a:off x="3672309" y="5555957"/>
-                <a:ext cx="5256584" cy="323165"/>
-              </a:xfrm>
-              <a:prstGeom prst="rect">
-                <a:avLst/>
-              </a:prstGeom>
-              <a:blipFill>
-                <a:blip r:embed="rId2"/>
-                <a:stretch>
-                  <a:fillRect t="-3774" b="-20755"/>
-                </a:stretch>
-              </a:blipFill>
-            </p:spPr>
-            <p:txBody>
-              <a:bodyPr/>
-              <a:lstStyle/>
-              <a:p>
-                <a:r>
-                  <a:rPr lang="en-GB">
-                    <a:noFill/>
-                  </a:rPr>
-                  <a:t> </a:t>
-                </a:r>
-              </a:p>
-            </p:txBody>
-          </p:sp>
-        </mc:Fallback>
-      </mc:AlternateContent>
-      <p:sp>
-        <p:nvSpPr>
-          <p:cNvPr id="3" name="Content Placeholder 2">
-            <a:extLst>
-              <a:ext uri="{FF2B5EF4-FFF2-40B4-BE49-F238E27FC236}">
-                <a16:creationId xmlns:a16="http://schemas.microsoft.com/office/drawing/2014/main" id="{EBF65667-25DB-4939-A098-F3E8F7F384F9}"/>
-              </a:ext>
-            </a:extLst>
-          </p:cNvPr>
-          <p:cNvSpPr>
-            <a:spLocks noGrp="1"/>
-          </p:cNvSpPr>
-          <p:nvPr>
-            <p:ph idx="1"/>
-          </p:nvPr>
-        </p:nvSpPr>
-        <p:spPr/>
-        <p:txBody>
-          <a:bodyPr/>
-          <a:lstStyle/>
-          <a:p>
-            <a:endParaRPr lang="en-GB"/>
-          </a:p>
-        </p:txBody>
-      </p:sp>
-    </p:spTree>
-    <p:extLst>
-      <p:ext uri="{BB962C8B-B14F-4D97-AF65-F5344CB8AC3E}">
-        <p14:creationId xmlns:p14="http://schemas.microsoft.com/office/powerpoint/2010/main" val="2600783763"/>
-      </p:ext>
-    </p:extLst>
-  </p:cSld>
-  <p:clrMapOvr>
-    <a:masterClrMapping/>
-  </p:clrMapOvr>
-</p:sld>
-</file>
-
-<file path=ppt/slides/slide12.xml><?xml version="1.0" encoding="utf-8"?>
-<p:sld xmlns:a="http://schemas.openxmlformats.org/drawingml/2006/main" xmlns:r="http://schemas.openxmlformats.org/officeDocument/2006/relationships" xmlns:p="http://schemas.openxmlformats.org/presentationml/2006/main">
-  <p:cSld>
-    <p:spTree>
-      <p:nvGrpSpPr>
-        <p:cNvPr id="1" name=""/>
-        <p:cNvGrpSpPr/>
-        <p:nvPr/>
-      </p:nvGrpSpPr>
-      <p:grpSpPr>
-        <a:xfrm>
-          <a:off x="0" y="0"/>
-          <a:ext cx="0" cy="0"/>
-          <a:chOff x="0" y="0"/>
-          <a:chExt cx="0" cy="0"/>
-        </a:xfrm>
-      </p:grpSpPr>
-      <p:sp>
-        <p:nvSpPr>
-          <p:cNvPr id="2" name="Title 1">
-            <a:extLst>
-              <a:ext uri="{FF2B5EF4-FFF2-40B4-BE49-F238E27FC236}">
-                <a16:creationId xmlns:a16="http://schemas.microsoft.com/office/drawing/2014/main" id="{55F718FC-F914-47AE-8321-2E443A41B361}"/>
-              </a:ext>
-            </a:extLst>
-          </p:cNvPr>
-          <p:cNvSpPr>
-            <a:spLocks noGrp="1"/>
-          </p:cNvSpPr>
-          <p:nvPr>
-            <p:ph type="title"/>
-          </p:nvPr>
-        </p:nvSpPr>
-        <p:spPr/>
-        <p:txBody>
-          <a:bodyPr/>
-          <a:lstStyle/>
-          <a:p>
-            <a:r>
-              <a:rPr lang="en-GB" dirty="0" err="1"/>
-              <a:t>Ergebnisse</a:t>
-            </a:r>
-            <a:endParaRPr lang="en-GB" dirty="0"/>
-          </a:p>
-        </p:txBody>
-      </p:sp>
-      <p:sp>
-        <p:nvSpPr>
-          <p:cNvPr id="4" name="Slide Number Placeholder 3">
-            <a:extLst>
-              <a:ext uri="{FF2B5EF4-FFF2-40B4-BE49-F238E27FC236}">
-                <a16:creationId xmlns:a16="http://schemas.microsoft.com/office/drawing/2014/main" id="{47F60390-EFB0-48AB-8A1D-0DBC3CB3839E}"/>
-              </a:ext>
-            </a:extLst>
-          </p:cNvPr>
-          <p:cNvSpPr>
-            <a:spLocks noGrp="1"/>
-          </p:cNvSpPr>
-          <p:nvPr>
-            <p:ph type="sldNum" sz="quarter" idx="10"/>
-          </p:nvPr>
-        </p:nvSpPr>
-        <p:spPr/>
-        <p:txBody>
-          <a:bodyPr/>
-          <a:lstStyle/>
-          <a:p>
-            <a:pPr>
-              <a:defRPr/>
-            </a:pPr>
-            <a:fld id="{BFD7839F-DA5C-4C13-94BA-0DC1947AAA90}" type="slidenum">
-              <a:rPr lang="de-DE" altLang="de-DE" smtClean="0"/>
-              <a:pPr>
-                <a:defRPr/>
-              </a:pPr>
-              <a:t>12</a:t>
-            </a:fld>
-            <a:endParaRPr lang="de-DE" altLang="de-DE" dirty="0"/>
-          </a:p>
-        </p:txBody>
-      </p:sp>
-      <p:sp>
-        <p:nvSpPr>
-          <p:cNvPr id="5" name="Footer Placeholder 4">
-            <a:extLst>
-              <a:ext uri="{FF2B5EF4-FFF2-40B4-BE49-F238E27FC236}">
-                <a16:creationId xmlns:a16="http://schemas.microsoft.com/office/drawing/2014/main" id="{9750D3C8-DB7A-4BA6-B272-E0A442B96B60}"/>
-              </a:ext>
-            </a:extLst>
-          </p:cNvPr>
-          <p:cNvSpPr>
-            <a:spLocks noGrp="1"/>
-          </p:cNvSpPr>
-          <p:nvPr>
-            <p:ph type="ftr" sz="quarter" idx="11"/>
-          </p:nvPr>
-        </p:nvSpPr>
-        <p:spPr/>
-        <p:txBody>
-          <a:bodyPr/>
-          <a:lstStyle/>
-          <a:p>
-            <a:pPr>
-              <a:defRPr/>
-            </a:pPr>
-            <a:r>
-              <a:rPr lang="de-DE" dirty="0"/>
-              <a:t>Template Matching - Sven Lesche</a:t>
-            </a:r>
-          </a:p>
-        </p:txBody>
-      </p:sp>
-      <mc:AlternateContent xmlns:mc="http://schemas.openxmlformats.org/markup-compatibility/2006">
-        <mc:Choice xmlns:a14="http://schemas.microsoft.com/office/drawing/2010/main" Requires="a14">
-          <p:sp>
-            <p:nvSpPr>
-              <p:cNvPr id="8" name="TextBox 7">
-                <a:extLst>
-                  <a:ext uri="{FF2B5EF4-FFF2-40B4-BE49-F238E27FC236}">
-                    <a16:creationId xmlns:a16="http://schemas.microsoft.com/office/drawing/2014/main" id="{7837F6F1-44F6-4972-BB94-F25988537A8E}"/>
-                  </a:ext>
-                </a:extLst>
-              </p:cNvPr>
-              <p:cNvSpPr txBox="1"/>
-              <p:nvPr/>
-            </p:nvSpPr>
-            <p:spPr>
-              <a:xfrm>
-                <a:off x="3672309" y="5555957"/>
-                <a:ext cx="5256584" cy="323165"/>
-              </a:xfrm>
-              <a:prstGeom prst="rect">
-                <a:avLst/>
-              </a:prstGeom>
-              <a:noFill/>
-            </p:spPr>
-            <p:txBody>
-              <a:bodyPr wrap="square" rtlCol="0">
-                <a:spAutoFit/>
-              </a:bodyPr>
-              <a:lstStyle/>
-              <a:p>
-                <a14:m>
-                  <m:oMath xmlns:m="http://schemas.openxmlformats.org/officeDocument/2006/math">
-                    <m:r>
-                      <a:rPr lang="en-GB" b="0" i="1" smtClean="0">
-                        <a:latin typeface="Cambria Math" panose="02040503050406030204" pitchFamily="18" charset="0"/>
-                      </a:rPr>
-                      <m:t>𝜒</m:t>
-                    </m:r>
-                    <m:r>
-                      <a:rPr lang="en-GB" b="0" i="1" smtClean="0">
-                        <a:latin typeface="Cambria Math" panose="02040503050406030204" pitchFamily="18" charset="0"/>
-                      </a:rPr>
-                      <m:t>2 </m:t>
-                    </m:r>
-                  </m:oMath>
-                </a14:m>
-                <a:r>
-                  <a:rPr lang="el-GR" dirty="0"/>
-                  <a:t>(7</a:t>
-                </a:r>
-                <a:r>
-                  <a:rPr lang="en-GB" dirty="0"/>
-                  <a:t>4</a:t>
-                </a:r>
-                <a:r>
-                  <a:rPr lang="el-GR" dirty="0"/>
-                  <a:t>) = 1</a:t>
-                </a:r>
-                <a:r>
-                  <a:rPr lang="en-GB" dirty="0"/>
-                  <a:t>33.39</a:t>
-                </a:r>
-                <a:r>
-                  <a:rPr lang="el-GR" dirty="0"/>
-                  <a:t>, </a:t>
-                </a:r>
-                <a:r>
-                  <a:rPr lang="en-GB" dirty="0"/>
-                  <a:t>p &lt; .0001, CFI = 0.90, RMSEA = 0.08</a:t>
+                  <a:t>p &lt; .0001, CFI = 0.90, RMSEA = 0.10</a:t>
                 </a:r>
               </a:p>
             </p:txBody>
@@ -8964,10 +8861,10 @@
       </mc:AlternateContent>
       <p:pic>
         <p:nvPicPr>
-          <p:cNvPr id="12" name="Content Placeholder 11">
-            <a:extLst>
-              <a:ext uri="{FF2B5EF4-FFF2-40B4-BE49-F238E27FC236}">
-                <a16:creationId xmlns:a16="http://schemas.microsoft.com/office/drawing/2014/main" id="{9072CE9E-FAC9-4EA4-B607-36B4ED54D7D8}"/>
+          <p:cNvPr id="7" name="Content Placeholder 6">
+            <a:extLst>
+              <a:ext uri="{FF2B5EF4-FFF2-40B4-BE49-F238E27FC236}">
+                <a16:creationId xmlns:a16="http://schemas.microsoft.com/office/drawing/2014/main" id="{27866387-6587-4B59-BA55-570A7FBCC50E}"/>
               </a:ext>
             </a:extLst>
           </p:cNvPr>
@@ -8986,20 +8883,20 @@
               </a:ext>
             </a:extLst>
           </a:blip>
-          <a:srcRect l="5612" t="9652" r="6577" b="9662"/>
+          <a:srcRect l="5612" t="9653" r="6577" b="11416"/>
           <a:stretch/>
         </p:blipFill>
         <p:spPr>
           <a:xfrm>
-            <a:off x="664473" y="1662314"/>
-            <a:ext cx="7311816" cy="3779141"/>
+            <a:off x="431949" y="1511895"/>
+            <a:ext cx="7542642" cy="3813695"/>
           </a:xfrm>
         </p:spPr>
       </p:pic>
     </p:spTree>
     <p:extLst>
       <p:ext uri="{BB962C8B-B14F-4D97-AF65-F5344CB8AC3E}">
-        <p14:creationId xmlns:p14="http://schemas.microsoft.com/office/powerpoint/2010/main" val="1451834514"/>
+        <p14:creationId xmlns:p14="http://schemas.microsoft.com/office/powerpoint/2010/main" val="2600783763"/>
       </p:ext>
     </p:extLst>
   </p:cSld>
@@ -9031,7 +8928,7 @@
           <p:cNvPr id="2" name="Title 1">
             <a:extLst>
               <a:ext uri="{FF2B5EF4-FFF2-40B4-BE49-F238E27FC236}">
-                <a16:creationId xmlns:a16="http://schemas.microsoft.com/office/drawing/2014/main" id="{3F2F7E55-CE78-40A7-B5B6-2AC85CBDE4CB}"/>
+                <a16:creationId xmlns:a16="http://schemas.microsoft.com/office/drawing/2014/main" id="{55F718FC-F914-47AE-8321-2E443A41B361}"/>
               </a:ext>
             </a:extLst>
           </p:cNvPr>
@@ -9048,41 +8945,9 @@
           <a:lstStyle/>
           <a:p>
             <a:r>
-              <a:rPr lang="en-GB" dirty="0"/>
-              <a:t>Was </a:t>
-            </a:r>
-            <a:r>
               <a:rPr lang="en-GB" dirty="0" err="1"/>
-              <a:t>bedeutet</a:t>
-            </a:r>
-            <a:r>
-              <a:rPr lang="en-GB" dirty="0"/>
-              <a:t> das?</a:t>
-            </a:r>
-          </a:p>
-        </p:txBody>
-      </p:sp>
-      <p:sp>
-        <p:nvSpPr>
-          <p:cNvPr id="3" name="Content Placeholder 2">
-            <a:extLst>
-              <a:ext uri="{FF2B5EF4-FFF2-40B4-BE49-F238E27FC236}">
-                <a16:creationId xmlns:a16="http://schemas.microsoft.com/office/drawing/2014/main" id="{90B94075-D215-472B-BF6F-68425F881C32}"/>
-              </a:ext>
-            </a:extLst>
-          </p:cNvPr>
-          <p:cNvSpPr>
-            <a:spLocks noGrp="1"/>
-          </p:cNvSpPr>
-          <p:nvPr>
-            <p:ph idx="1"/>
-          </p:nvPr>
-        </p:nvSpPr>
-        <p:spPr/>
-        <p:txBody>
-          <a:bodyPr/>
-          <a:lstStyle/>
-          <a:p>
+              <a:t>Ergebnisse</a:t>
+            </a:r>
             <a:endParaRPr lang="en-GB" dirty="0"/>
           </a:p>
         </p:txBody>
@@ -9092,7 +8957,7 @@
           <p:cNvPr id="4" name="Slide Number Placeholder 3">
             <a:extLst>
               <a:ext uri="{FF2B5EF4-FFF2-40B4-BE49-F238E27FC236}">
-                <a16:creationId xmlns:a16="http://schemas.microsoft.com/office/drawing/2014/main" id="{11D63F32-D82E-48E2-974D-58E5C0A0962E}"/>
+                <a16:creationId xmlns:a16="http://schemas.microsoft.com/office/drawing/2014/main" id="{47F60390-EFB0-48AB-8A1D-0DBC3CB3839E}"/>
               </a:ext>
             </a:extLst>
           </p:cNvPr>
@@ -9127,7 +8992,7 @@
           <p:cNvPr id="5" name="Footer Placeholder 4">
             <a:extLst>
               <a:ext uri="{FF2B5EF4-FFF2-40B4-BE49-F238E27FC236}">
-                <a16:creationId xmlns:a16="http://schemas.microsoft.com/office/drawing/2014/main" id="{D5E34673-0C27-48C5-9C51-49FB18ADCF5A}"/>
+                <a16:creationId xmlns:a16="http://schemas.microsoft.com/office/drawing/2014/main" id="{9750D3C8-DB7A-4BA6-B272-E0A442B96B60}"/>
               </a:ext>
             </a:extLst>
           </p:cNvPr>
@@ -9147,17 +9012,169 @@
               <a:defRPr/>
             </a:pPr>
             <a:r>
-              <a:rPr lang="de-DE"/>
+              <a:rPr lang="de-DE" dirty="0"/>
               <a:t>Template Matching - Sven Lesche</a:t>
             </a:r>
-            <a:endParaRPr lang="de-DE" dirty="0"/>
-          </a:p>
-        </p:txBody>
-      </p:sp>
+          </a:p>
+        </p:txBody>
+      </p:sp>
+      <p:pic>
+        <p:nvPicPr>
+          <p:cNvPr id="7" name="Content Placeholder 6">
+            <a:extLst>
+              <a:ext uri="{FF2B5EF4-FFF2-40B4-BE49-F238E27FC236}">
+                <a16:creationId xmlns:a16="http://schemas.microsoft.com/office/drawing/2014/main" id="{E40F06B1-5CC0-46C6-8BD8-3EEEDB061452}"/>
+              </a:ext>
+            </a:extLst>
+          </p:cNvPr>
+          <p:cNvPicPr>
+            <a:picLocks noGrp="1" noChangeAspect="1"/>
+          </p:cNvPicPr>
+          <p:nvPr>
+            <p:ph idx="1"/>
+          </p:nvPr>
+        </p:nvPicPr>
+        <p:blipFill rotWithShape="1">
+          <a:blip r:embed="rId2">
+            <a:extLst>
+              <a:ext uri="{28A0092B-C50C-407E-A947-70E740481C1C}">
+                <a14:useLocalDpi xmlns:a14="http://schemas.microsoft.com/office/drawing/2010/main" val="0"/>
+              </a:ext>
+            </a:extLst>
+          </a:blip>
+          <a:srcRect l="5601" t="470" r="10534" b="-450"/>
+          <a:stretch/>
+        </p:blipFill>
+        <p:spPr>
+          <a:xfrm>
+            <a:off x="1008013" y="1208646"/>
+            <a:ext cx="6768751" cy="4539045"/>
+          </a:xfrm>
+        </p:spPr>
+      </p:pic>
+      <mc:AlternateContent xmlns:mc="http://schemas.openxmlformats.org/markup-compatibility/2006">
+        <mc:Choice xmlns:a14="http://schemas.microsoft.com/office/drawing/2010/main" Requires="a14">
+          <p:sp>
+            <p:nvSpPr>
+              <p:cNvPr id="8" name="TextBox 7">
+                <a:extLst>
+                  <a:ext uri="{FF2B5EF4-FFF2-40B4-BE49-F238E27FC236}">
+                    <a16:creationId xmlns:a16="http://schemas.microsoft.com/office/drawing/2014/main" id="{7837F6F1-44F6-4972-BB94-F25988537A8E}"/>
+                  </a:ext>
+                </a:extLst>
+              </p:cNvPr>
+              <p:cNvSpPr txBox="1"/>
+              <p:nvPr/>
+            </p:nvSpPr>
+            <p:spPr>
+              <a:xfrm>
+                <a:off x="3672309" y="5555957"/>
+                <a:ext cx="5256584" cy="323165"/>
+              </a:xfrm>
+              <a:prstGeom prst="rect">
+                <a:avLst/>
+              </a:prstGeom>
+              <a:noFill/>
+            </p:spPr>
+            <p:txBody>
+              <a:bodyPr wrap="square" rtlCol="0">
+                <a:spAutoFit/>
+              </a:bodyPr>
+              <a:lstStyle/>
+              <a:p>
+                <a14:m>
+                  <m:oMath xmlns:m="http://schemas.openxmlformats.org/officeDocument/2006/math">
+                    <m:r>
+                      <a:rPr lang="en-GB" b="0" i="1" smtClean="0">
+                        <a:latin typeface="Cambria Math" panose="02040503050406030204" pitchFamily="18" charset="0"/>
+                      </a:rPr>
+                      <m:t>𝜒</m:t>
+                    </m:r>
+                    <m:r>
+                      <a:rPr lang="en-GB" b="0" i="1" smtClean="0">
+                        <a:latin typeface="Cambria Math" panose="02040503050406030204" pitchFamily="18" charset="0"/>
+                      </a:rPr>
+                      <m:t>2 </m:t>
+                    </m:r>
+                  </m:oMath>
+                </a14:m>
+                <a:r>
+                  <a:rPr lang="el-GR" dirty="0"/>
+                  <a:t>(</a:t>
+                </a:r>
+                <a:r>
+                  <a:rPr lang="en-GB" dirty="0"/>
+                  <a:t>201</a:t>
+                </a:r>
+                <a:r>
+                  <a:rPr lang="el-GR" dirty="0"/>
+                  <a:t>) = </a:t>
+                </a:r>
+                <a:r>
+                  <a:rPr lang="en-GB" dirty="0"/>
+                  <a:t>413.64</a:t>
+                </a:r>
+                <a:r>
+                  <a:rPr lang="el-GR" dirty="0"/>
+                  <a:t>, </a:t>
+                </a:r>
+                <a:r>
+                  <a:rPr lang="en-GB" dirty="0"/>
+                  <a:t>p &lt; .0001, CFI = 0.85, RMSEA = 0.09</a:t>
+                </a:r>
+              </a:p>
+            </p:txBody>
+          </p:sp>
+        </mc:Choice>
+        <mc:Fallback>
+          <p:sp>
+            <p:nvSpPr>
+              <p:cNvPr id="8" name="TextBox 7">
+                <a:extLst>
+                  <a:ext uri="{FF2B5EF4-FFF2-40B4-BE49-F238E27FC236}">
+                    <a16:creationId xmlns:a16="http://schemas.microsoft.com/office/drawing/2014/main" id="{7837F6F1-44F6-4972-BB94-F25988537A8E}"/>
+                  </a:ext>
+                </a:extLst>
+              </p:cNvPr>
+              <p:cNvSpPr txBox="1">
+                <a:spLocks noRot="1" noChangeAspect="1" noMove="1" noResize="1" noEditPoints="1" noAdjustHandles="1" noChangeArrowheads="1" noChangeShapeType="1" noTextEdit="1"/>
+              </p:cNvSpPr>
+              <p:nvPr/>
+            </p:nvSpPr>
+            <p:spPr>
+              <a:xfrm>
+                <a:off x="3672309" y="5555957"/>
+                <a:ext cx="5256584" cy="323165"/>
+              </a:xfrm>
+              <a:prstGeom prst="rect">
+                <a:avLst/>
+              </a:prstGeom>
+              <a:blipFill>
+                <a:blip r:embed="rId3"/>
+                <a:stretch>
+                  <a:fillRect t="-3774" b="-20755"/>
+                </a:stretch>
+              </a:blipFill>
+            </p:spPr>
+            <p:txBody>
+              <a:bodyPr/>
+              <a:lstStyle/>
+              <a:p>
+                <a:r>
+                  <a:rPr lang="en-GB">
+                    <a:noFill/>
+                  </a:rPr>
+                  <a:t> </a:t>
+                </a:r>
+              </a:p>
+            </p:txBody>
+          </p:sp>
+        </mc:Fallback>
+      </mc:AlternateContent>
     </p:spTree>
     <p:extLst>
       <p:ext uri="{BB962C8B-B14F-4D97-AF65-F5344CB8AC3E}">
-        <p14:creationId xmlns:p14="http://schemas.microsoft.com/office/powerpoint/2010/main" val="878235353"/>
+        <p14:creationId xmlns:p14="http://schemas.microsoft.com/office/powerpoint/2010/main" val="1451834514"/>
       </p:ext>
     </p:extLst>
   </p:cSld>
@@ -9189,7 +9206,7 @@
           <p:cNvPr id="2" name="Title 1">
             <a:extLst>
               <a:ext uri="{FF2B5EF4-FFF2-40B4-BE49-F238E27FC236}">
-                <a16:creationId xmlns:a16="http://schemas.microsoft.com/office/drawing/2014/main" id="{D3B50BC0-6F8D-41F1-9CFA-7E46F5D89E68}"/>
+                <a16:creationId xmlns:a16="http://schemas.microsoft.com/office/drawing/2014/main" id="{3F2F7E55-CE78-40A7-B5B6-2AC85CBDE4CB}"/>
               </a:ext>
             </a:extLst>
           </p:cNvPr>
@@ -9206,35 +9223,133 @@
           <a:lstStyle/>
           <a:p>
             <a:r>
+              <a:rPr lang="en-GB" dirty="0"/>
+              <a:t>Was </a:t>
+            </a:r>
+            <a:r>
               <a:rPr lang="en-GB" dirty="0" err="1"/>
-              <a:t>Referenzen</a:t>
-            </a:r>
+              <a:t>bedeutet</a:t>
+            </a:r>
+            <a:r>
+              <a:rPr lang="en-GB" dirty="0"/>
+              <a:t> das?</a:t>
+            </a:r>
+          </a:p>
+        </p:txBody>
+      </p:sp>
+      <p:sp>
+        <p:nvSpPr>
+          <p:cNvPr id="3" name="Content Placeholder 2">
+            <a:extLst>
+              <a:ext uri="{FF2B5EF4-FFF2-40B4-BE49-F238E27FC236}">
+                <a16:creationId xmlns:a16="http://schemas.microsoft.com/office/drawing/2014/main" id="{90B94075-D215-472B-BF6F-68425F881C32}"/>
+              </a:ext>
+            </a:extLst>
+          </p:cNvPr>
+          <p:cNvSpPr>
+            <a:spLocks noGrp="1"/>
+          </p:cNvSpPr>
+          <p:nvPr>
+            <p:ph idx="1"/>
+          </p:nvPr>
+        </p:nvSpPr>
+        <p:spPr/>
+        <p:txBody>
+          <a:bodyPr/>
+          <a:lstStyle/>
+          <a:p>
+            <a:r>
+              <a:rPr lang="en-GB" dirty="0"/>
+              <a:t>Alpha negative </a:t>
+            </a:r>
+            <a:r>
+              <a:rPr lang="en-GB" dirty="0" err="1"/>
+              <a:t>korreliert</a:t>
+            </a:r>
+            <a:r>
+              <a:rPr lang="en-GB" dirty="0"/>
+              <a:t> -&gt; </a:t>
+            </a:r>
+            <a:r>
+              <a:rPr lang="en-GB" dirty="0" err="1"/>
+              <a:t>weniger</a:t>
+            </a:r>
+            <a:r>
+              <a:rPr lang="en-GB" dirty="0"/>
+              <a:t> </a:t>
+            </a:r>
+            <a:r>
+              <a:rPr lang="en-GB" dirty="0" err="1"/>
+              <a:t>stabil</a:t>
+            </a:r>
+            <a:r>
+              <a:rPr lang="en-GB" dirty="0"/>
+              <a:t>…</a:t>
+            </a:r>
+          </a:p>
+          <a:p>
             <a:endParaRPr lang="en-GB" dirty="0"/>
           </a:p>
-        </p:txBody>
-      </p:sp>
-      <p:sp>
-        <p:nvSpPr>
-          <p:cNvPr id="3" name="Content Placeholder 2">
-            <a:extLst>
-              <a:ext uri="{FF2B5EF4-FFF2-40B4-BE49-F238E27FC236}">
-                <a16:creationId xmlns:a16="http://schemas.microsoft.com/office/drawing/2014/main" id="{7FE8FECA-6BCA-4541-B5A2-B70B410DBDD6}"/>
-              </a:ext>
-            </a:extLst>
-          </p:cNvPr>
-          <p:cNvSpPr>
-            <a:spLocks noGrp="1"/>
-          </p:cNvSpPr>
-          <p:nvPr>
-            <p:ph idx="1"/>
-          </p:nvPr>
-        </p:nvSpPr>
-        <p:spPr/>
-        <p:txBody>
-          <a:bodyPr/>
-          <a:lstStyle/>
-          <a:p>
-            <a:endParaRPr lang="en-GB"/>
+          <a:p>
+            <a:r>
+              <a:rPr lang="en-GB" dirty="0"/>
+              <a:t>Alpha und v </a:t>
+            </a:r>
+            <a:r>
+              <a:rPr lang="en-GB" dirty="0" err="1"/>
+              <a:t>kaum</a:t>
+            </a:r>
+            <a:r>
+              <a:rPr lang="en-GB" dirty="0"/>
+              <a:t> </a:t>
+            </a:r>
+            <a:r>
+              <a:rPr lang="en-GB" dirty="0" err="1"/>
+              <a:t>korreliert</a:t>
+            </a:r>
+            <a:r>
+              <a:rPr lang="en-GB" dirty="0"/>
+              <a:t> </a:t>
+            </a:r>
+          </a:p>
+          <a:p>
+            <a:endParaRPr lang="en-GB" dirty="0"/>
+          </a:p>
+          <a:p>
+            <a:r>
+              <a:rPr lang="en-GB" dirty="0"/>
+              <a:t>Alpha </a:t>
+            </a:r>
+            <a:r>
+              <a:rPr lang="en-GB" dirty="0" err="1"/>
+              <a:t>genau</a:t>
+            </a:r>
+            <a:r>
+              <a:rPr lang="en-GB" dirty="0"/>
+              <a:t> so stark </a:t>
+            </a:r>
+            <a:r>
+              <a:rPr lang="en-GB" dirty="0" err="1"/>
+              <a:t>korreliert</a:t>
+            </a:r>
+            <a:r>
+              <a:rPr lang="en-GB" dirty="0"/>
+              <a:t> </a:t>
+            </a:r>
+            <a:r>
+              <a:rPr lang="en-GB" dirty="0" err="1"/>
+              <a:t>wie</a:t>
+            </a:r>
+            <a:r>
+              <a:rPr lang="en-GB" dirty="0"/>
+              <a:t> v</a:t>
+            </a:r>
+          </a:p>
+          <a:p>
+            <a:endParaRPr lang="en-GB" dirty="0"/>
+          </a:p>
+          <a:p>
+            <a:endParaRPr lang="en-GB" dirty="0"/>
           </a:p>
         </p:txBody>
       </p:sp>
@@ -9243,7 +9358,7 @@
           <p:cNvPr id="4" name="Slide Number Placeholder 3">
             <a:extLst>
               <a:ext uri="{FF2B5EF4-FFF2-40B4-BE49-F238E27FC236}">
-                <a16:creationId xmlns:a16="http://schemas.microsoft.com/office/drawing/2014/main" id="{0137B619-D85A-444F-ACC7-5643511CB572}"/>
+                <a16:creationId xmlns:a16="http://schemas.microsoft.com/office/drawing/2014/main" id="{11D63F32-D82E-48E2-974D-58E5C0A0962E}"/>
               </a:ext>
             </a:extLst>
           </p:cNvPr>
@@ -9278,7 +9393,7 @@
           <p:cNvPr id="5" name="Footer Placeholder 4">
             <a:extLst>
               <a:ext uri="{FF2B5EF4-FFF2-40B4-BE49-F238E27FC236}">
-                <a16:creationId xmlns:a16="http://schemas.microsoft.com/office/drawing/2014/main" id="{8D583B10-FE33-4120-953F-21B278068935}"/>
+                <a16:creationId xmlns:a16="http://schemas.microsoft.com/office/drawing/2014/main" id="{D5E34673-0C27-48C5-9C51-49FB18ADCF5A}"/>
               </a:ext>
             </a:extLst>
           </p:cNvPr>
@@ -9308,7 +9423,7 @@
     </p:spTree>
     <p:extLst>
       <p:ext uri="{BB962C8B-B14F-4D97-AF65-F5344CB8AC3E}">
-        <p14:creationId xmlns:p14="http://schemas.microsoft.com/office/powerpoint/2010/main" val="2098020814"/>
+        <p14:creationId xmlns:p14="http://schemas.microsoft.com/office/powerpoint/2010/main" val="878235353"/>
       </p:ext>
     </p:extLst>
   </p:cSld>
@@ -9340,7 +9455,7 @@
           <p:cNvPr id="2" name="Title 1">
             <a:extLst>
               <a:ext uri="{FF2B5EF4-FFF2-40B4-BE49-F238E27FC236}">
-                <a16:creationId xmlns:a16="http://schemas.microsoft.com/office/drawing/2014/main" id="{1FC9893D-A041-4C43-BBDB-A41FD3CE7DBF}"/>
+                <a16:creationId xmlns:a16="http://schemas.microsoft.com/office/drawing/2014/main" id="{EF95B3FB-CCB0-4F8A-8C8E-ACDBCEEA132E}"/>
               </a:ext>
             </a:extLst>
           </p:cNvPr>
@@ -9358,52 +9473,126 @@
           <a:p>
             <a:r>
               <a:rPr lang="en-GB" dirty="0" err="1"/>
-              <a:t>Korrelationsmatrix</a:t>
+              <a:t>Limitationen</a:t>
             </a:r>
             <a:endParaRPr lang="en-GB" dirty="0"/>
           </a:p>
         </p:txBody>
       </p:sp>
-      <p:pic>
-        <p:nvPicPr>
-          <p:cNvPr id="7" name="Content Placeholder 6">
-            <a:extLst>
-              <a:ext uri="{FF2B5EF4-FFF2-40B4-BE49-F238E27FC236}">
-                <a16:creationId xmlns:a16="http://schemas.microsoft.com/office/drawing/2014/main" id="{9475ECD4-E6E9-4915-A536-1083E18CB291}"/>
-              </a:ext>
-            </a:extLst>
-          </p:cNvPr>
-          <p:cNvPicPr>
-            <a:picLocks noGrp="1" noChangeAspect="1"/>
-          </p:cNvPicPr>
+      <p:sp>
+        <p:nvSpPr>
+          <p:cNvPr id="3" name="Content Placeholder 2">
+            <a:extLst>
+              <a:ext uri="{FF2B5EF4-FFF2-40B4-BE49-F238E27FC236}">
+                <a16:creationId xmlns:a16="http://schemas.microsoft.com/office/drawing/2014/main" id="{297A1FCB-5248-417C-815E-40816280C9AF}"/>
+              </a:ext>
+            </a:extLst>
+          </p:cNvPr>
+          <p:cNvSpPr>
+            <a:spLocks noGrp="1"/>
+          </p:cNvSpPr>
           <p:nvPr>
             <p:ph idx="1"/>
           </p:nvPr>
-        </p:nvPicPr>
-        <p:blipFill rotWithShape="1">
-          <a:blip r:embed="rId2">
-            <a:extLst>
-              <a:ext uri="{28A0092B-C50C-407E-A947-70E740481C1C}">
-                <a14:useLocalDpi xmlns:a14="http://schemas.microsoft.com/office/drawing/2010/main" val="0"/>
-              </a:ext>
-            </a:extLst>
-          </a:blip>
-          <a:srcRect l="28575" t="8411" r="27534" b="3785"/>
-          <a:stretch/>
-        </p:blipFill>
-        <p:spPr>
-          <a:xfrm>
-            <a:off x="1823285" y="1188569"/>
-            <a:ext cx="4994192" cy="4799356"/>
-          </a:xfrm>
-        </p:spPr>
-      </p:pic>
+        </p:nvSpPr>
+        <p:spPr/>
+        <p:txBody>
+          <a:bodyPr/>
+          <a:lstStyle/>
+          <a:p>
+            <a:r>
+              <a:rPr lang="en-GB" dirty="0"/>
+              <a:t>Aber: model fit…</a:t>
+            </a:r>
+          </a:p>
+          <a:p>
+            <a:endParaRPr lang="en-GB" dirty="0"/>
+          </a:p>
+          <a:p>
+            <a:r>
+              <a:rPr lang="en-GB" dirty="0" err="1"/>
+              <a:t>Richtung</a:t>
+            </a:r>
+            <a:r>
+              <a:rPr lang="en-GB" dirty="0"/>
+              <a:t> </a:t>
+            </a:r>
+            <a:r>
+              <a:rPr lang="en-GB" dirty="0" err="1"/>
+              <a:t>bleibt</a:t>
+            </a:r>
+            <a:r>
+              <a:rPr lang="en-GB" dirty="0"/>
+              <a:t> </a:t>
+            </a:r>
+            <a:r>
+              <a:rPr lang="en-GB" dirty="0" err="1"/>
+              <a:t>aber</a:t>
+            </a:r>
+            <a:r>
+              <a:rPr lang="en-GB" dirty="0"/>
+              <a:t> </a:t>
+            </a:r>
+            <a:r>
+              <a:rPr lang="en-GB" dirty="0" err="1"/>
+              <a:t>klar</a:t>
+            </a:r>
+            <a:endParaRPr lang="en-GB" dirty="0"/>
+          </a:p>
+          <a:p>
+            <a:endParaRPr lang="en-GB" dirty="0"/>
+          </a:p>
+          <a:p>
+            <a:r>
+              <a:rPr lang="en-GB" dirty="0"/>
+              <a:t>Mal </a:t>
+            </a:r>
+            <a:r>
+              <a:rPr lang="en-GB" dirty="0" err="1"/>
+              <a:t>schauen</a:t>
+            </a:r>
+            <a:r>
+              <a:rPr lang="en-GB" dirty="0"/>
+              <a:t>, </a:t>
+            </a:r>
+            <a:r>
+              <a:rPr lang="en-GB" dirty="0" err="1"/>
+              <a:t>wie</a:t>
+            </a:r>
+            <a:r>
+              <a:rPr lang="en-GB" dirty="0"/>
+              <a:t> das in </a:t>
+            </a:r>
+            <a:r>
+              <a:rPr lang="en-GB" dirty="0" err="1"/>
+              <a:t>schwierigen</a:t>
+            </a:r>
+            <a:r>
+              <a:rPr lang="en-GB" dirty="0"/>
+              <a:t> </a:t>
+            </a:r>
+            <a:r>
+              <a:rPr lang="en-GB" dirty="0" err="1"/>
+              <a:t>Aufgaben</a:t>
+            </a:r>
+            <a:r>
+              <a:rPr lang="en-GB" dirty="0"/>
+              <a:t> </a:t>
+            </a:r>
+            <a:r>
+              <a:rPr lang="en-GB" dirty="0" err="1"/>
+              <a:t>aussieht</a:t>
+            </a:r>
+            <a:endParaRPr lang="en-GB" dirty="0"/>
+          </a:p>
+        </p:txBody>
+      </p:sp>
       <p:sp>
         <p:nvSpPr>
           <p:cNvPr id="4" name="Slide Number Placeholder 3">
             <a:extLst>
               <a:ext uri="{FF2B5EF4-FFF2-40B4-BE49-F238E27FC236}">
-                <a16:creationId xmlns:a16="http://schemas.microsoft.com/office/drawing/2014/main" id="{85E6A3A9-2A54-4DA4-A52D-0FAA0714711E}"/>
+                <a16:creationId xmlns:a16="http://schemas.microsoft.com/office/drawing/2014/main" id="{48CA12B6-6DF8-4C4D-8FF4-ACE77D6A8EDB}"/>
               </a:ext>
             </a:extLst>
           </p:cNvPr>
@@ -9438,7 +9627,7 @@
           <p:cNvPr id="5" name="Footer Placeholder 4">
             <a:extLst>
               <a:ext uri="{FF2B5EF4-FFF2-40B4-BE49-F238E27FC236}">
-                <a16:creationId xmlns:a16="http://schemas.microsoft.com/office/drawing/2014/main" id="{F120ACAD-B4EB-45C6-96F0-6800F0C6FF8C}"/>
+                <a16:creationId xmlns:a16="http://schemas.microsoft.com/office/drawing/2014/main" id="{BED90087-B965-4FBA-9C53-18A7F5A2827F}"/>
               </a:ext>
             </a:extLst>
           </p:cNvPr>
@@ -9468,7 +9657,7 @@
     </p:spTree>
     <p:extLst>
       <p:ext uri="{BB962C8B-B14F-4D97-AF65-F5344CB8AC3E}">
-        <p14:creationId xmlns:p14="http://schemas.microsoft.com/office/powerpoint/2010/main" val="2906963703"/>
+        <p14:creationId xmlns:p14="http://schemas.microsoft.com/office/powerpoint/2010/main" val="84882964"/>
       </p:ext>
     </p:extLst>
   </p:cSld>
@@ -9500,7 +9689,7 @@
           <p:cNvPr id="2" name="Title 1">
             <a:extLst>
               <a:ext uri="{FF2B5EF4-FFF2-40B4-BE49-F238E27FC236}">
-                <a16:creationId xmlns:a16="http://schemas.microsoft.com/office/drawing/2014/main" id="{5324BE47-D7E2-451B-BD63-7849D2924EF2}"/>
+                <a16:creationId xmlns:a16="http://schemas.microsoft.com/office/drawing/2014/main" id="{D3B50BC0-6F8D-41F1-9CFA-7E46F5D89E68}"/>
               </a:ext>
             </a:extLst>
           </p:cNvPr>
@@ -9517,9 +9706,35 @@
           <a:lstStyle/>
           <a:p>
             <a:r>
-              <a:rPr lang="en-GB" dirty="0"/>
-              <a:t>Model Checks: Bias</a:t>
-            </a:r>
+              <a:rPr lang="en-GB" dirty="0" err="1"/>
+              <a:t>Referenzen</a:t>
+            </a:r>
+            <a:endParaRPr lang="en-GB" dirty="0"/>
+          </a:p>
+        </p:txBody>
+      </p:sp>
+      <p:sp>
+        <p:nvSpPr>
+          <p:cNvPr id="3" name="Content Placeholder 2">
+            <a:extLst>
+              <a:ext uri="{FF2B5EF4-FFF2-40B4-BE49-F238E27FC236}">
+                <a16:creationId xmlns:a16="http://schemas.microsoft.com/office/drawing/2014/main" id="{7FE8FECA-6BCA-4541-B5A2-B70B410DBDD6}"/>
+              </a:ext>
+            </a:extLst>
+          </p:cNvPr>
+          <p:cNvSpPr>
+            <a:spLocks noGrp="1"/>
+          </p:cNvSpPr>
+          <p:nvPr>
+            <p:ph idx="1"/>
+          </p:nvPr>
+        </p:nvSpPr>
+        <p:spPr/>
+        <p:txBody>
+          <a:bodyPr/>
+          <a:lstStyle/>
+          <a:p>
+            <a:endParaRPr lang="en-GB"/>
           </a:p>
         </p:txBody>
       </p:sp>
@@ -9528,7 +9743,7 @@
           <p:cNvPr id="4" name="Slide Number Placeholder 3">
             <a:extLst>
               <a:ext uri="{FF2B5EF4-FFF2-40B4-BE49-F238E27FC236}">
-                <a16:creationId xmlns:a16="http://schemas.microsoft.com/office/drawing/2014/main" id="{2616A68B-E1DE-430F-BFA1-C742BB75D719}"/>
+                <a16:creationId xmlns:a16="http://schemas.microsoft.com/office/drawing/2014/main" id="{0137B619-D85A-444F-ACC7-5643511CB572}"/>
               </a:ext>
             </a:extLst>
           </p:cNvPr>
@@ -9553,6 +9768,291 @@
                 <a:defRPr/>
               </a:pPr>
               <a:t>16</a:t>
+            </a:fld>
+            <a:endParaRPr lang="de-DE" altLang="de-DE" dirty="0"/>
+          </a:p>
+        </p:txBody>
+      </p:sp>
+      <p:sp>
+        <p:nvSpPr>
+          <p:cNvPr id="5" name="Footer Placeholder 4">
+            <a:extLst>
+              <a:ext uri="{FF2B5EF4-FFF2-40B4-BE49-F238E27FC236}">
+                <a16:creationId xmlns:a16="http://schemas.microsoft.com/office/drawing/2014/main" id="{8D583B10-FE33-4120-953F-21B278068935}"/>
+              </a:ext>
+            </a:extLst>
+          </p:cNvPr>
+          <p:cNvSpPr>
+            <a:spLocks noGrp="1"/>
+          </p:cNvSpPr>
+          <p:nvPr>
+            <p:ph type="ftr" sz="quarter" idx="11"/>
+          </p:nvPr>
+        </p:nvSpPr>
+        <p:spPr/>
+        <p:txBody>
+          <a:bodyPr/>
+          <a:lstStyle/>
+          <a:p>
+            <a:pPr>
+              <a:defRPr/>
+            </a:pPr>
+            <a:r>
+              <a:rPr lang="de-DE"/>
+              <a:t>Template Matching - Sven Lesche</a:t>
+            </a:r>
+            <a:endParaRPr lang="de-DE" dirty="0"/>
+          </a:p>
+        </p:txBody>
+      </p:sp>
+    </p:spTree>
+    <p:extLst>
+      <p:ext uri="{BB962C8B-B14F-4D97-AF65-F5344CB8AC3E}">
+        <p14:creationId xmlns:p14="http://schemas.microsoft.com/office/powerpoint/2010/main" val="2098020814"/>
+      </p:ext>
+    </p:extLst>
+  </p:cSld>
+  <p:clrMapOvr>
+    <a:masterClrMapping/>
+  </p:clrMapOvr>
+</p:sld>
+</file>
+
+<file path=ppt/slides/slide17.xml><?xml version="1.0" encoding="utf-8"?>
+<p:sld xmlns:a="http://schemas.openxmlformats.org/drawingml/2006/main" xmlns:r="http://schemas.openxmlformats.org/officeDocument/2006/relationships" xmlns:p="http://schemas.openxmlformats.org/presentationml/2006/main">
+  <p:cSld>
+    <p:spTree>
+      <p:nvGrpSpPr>
+        <p:cNvPr id="1" name=""/>
+        <p:cNvGrpSpPr/>
+        <p:nvPr/>
+      </p:nvGrpSpPr>
+      <p:grpSpPr>
+        <a:xfrm>
+          <a:off x="0" y="0"/>
+          <a:ext cx="0" cy="0"/>
+          <a:chOff x="0" y="0"/>
+          <a:chExt cx="0" cy="0"/>
+        </a:xfrm>
+      </p:grpSpPr>
+      <p:sp>
+        <p:nvSpPr>
+          <p:cNvPr id="2" name="Title 1">
+            <a:extLst>
+              <a:ext uri="{FF2B5EF4-FFF2-40B4-BE49-F238E27FC236}">
+                <a16:creationId xmlns:a16="http://schemas.microsoft.com/office/drawing/2014/main" id="{1FC9893D-A041-4C43-BBDB-A41FD3CE7DBF}"/>
+              </a:ext>
+            </a:extLst>
+          </p:cNvPr>
+          <p:cNvSpPr>
+            <a:spLocks noGrp="1"/>
+          </p:cNvSpPr>
+          <p:nvPr>
+            <p:ph type="title"/>
+          </p:nvPr>
+        </p:nvSpPr>
+        <p:spPr/>
+        <p:txBody>
+          <a:bodyPr/>
+          <a:lstStyle/>
+          <a:p>
+            <a:r>
+              <a:rPr lang="en-GB" dirty="0" err="1"/>
+              <a:t>Korrelationsmatrix</a:t>
+            </a:r>
+            <a:endParaRPr lang="en-GB" dirty="0"/>
+          </a:p>
+        </p:txBody>
+      </p:sp>
+      <p:pic>
+        <p:nvPicPr>
+          <p:cNvPr id="7" name="Content Placeholder 6">
+            <a:extLst>
+              <a:ext uri="{FF2B5EF4-FFF2-40B4-BE49-F238E27FC236}">
+                <a16:creationId xmlns:a16="http://schemas.microsoft.com/office/drawing/2014/main" id="{9475ECD4-E6E9-4915-A536-1083E18CB291}"/>
+              </a:ext>
+            </a:extLst>
+          </p:cNvPr>
+          <p:cNvPicPr>
+            <a:picLocks noGrp="1" noChangeAspect="1"/>
+          </p:cNvPicPr>
+          <p:nvPr>
+            <p:ph idx="1"/>
+          </p:nvPr>
+        </p:nvPicPr>
+        <p:blipFill rotWithShape="1">
+          <a:blip r:embed="rId2">
+            <a:extLst>
+              <a:ext uri="{28A0092B-C50C-407E-A947-70E740481C1C}">
+                <a14:useLocalDpi xmlns:a14="http://schemas.microsoft.com/office/drawing/2010/main" val="0"/>
+              </a:ext>
+            </a:extLst>
+          </a:blip>
+          <a:srcRect l="28575" t="8411" r="27534" b="3785"/>
+          <a:stretch/>
+        </p:blipFill>
+        <p:spPr>
+          <a:xfrm>
+            <a:off x="1823285" y="1188569"/>
+            <a:ext cx="4994192" cy="4799356"/>
+          </a:xfrm>
+        </p:spPr>
+      </p:pic>
+      <p:sp>
+        <p:nvSpPr>
+          <p:cNvPr id="4" name="Slide Number Placeholder 3">
+            <a:extLst>
+              <a:ext uri="{FF2B5EF4-FFF2-40B4-BE49-F238E27FC236}">
+                <a16:creationId xmlns:a16="http://schemas.microsoft.com/office/drawing/2014/main" id="{85E6A3A9-2A54-4DA4-A52D-0FAA0714711E}"/>
+              </a:ext>
+            </a:extLst>
+          </p:cNvPr>
+          <p:cNvSpPr>
+            <a:spLocks noGrp="1"/>
+          </p:cNvSpPr>
+          <p:nvPr>
+            <p:ph type="sldNum" sz="quarter" idx="10"/>
+          </p:nvPr>
+        </p:nvSpPr>
+        <p:spPr/>
+        <p:txBody>
+          <a:bodyPr/>
+          <a:lstStyle/>
+          <a:p>
+            <a:pPr>
+              <a:defRPr/>
+            </a:pPr>
+            <a:fld id="{BFD7839F-DA5C-4C13-94BA-0DC1947AAA90}" type="slidenum">
+              <a:rPr lang="de-DE" altLang="de-DE" smtClean="0"/>
+              <a:pPr>
+                <a:defRPr/>
+              </a:pPr>
+              <a:t>17</a:t>
+            </a:fld>
+            <a:endParaRPr lang="de-DE" altLang="de-DE" dirty="0"/>
+          </a:p>
+        </p:txBody>
+      </p:sp>
+      <p:sp>
+        <p:nvSpPr>
+          <p:cNvPr id="5" name="Footer Placeholder 4">
+            <a:extLst>
+              <a:ext uri="{FF2B5EF4-FFF2-40B4-BE49-F238E27FC236}">
+                <a16:creationId xmlns:a16="http://schemas.microsoft.com/office/drawing/2014/main" id="{F120ACAD-B4EB-45C6-96F0-6800F0C6FF8C}"/>
+              </a:ext>
+            </a:extLst>
+          </p:cNvPr>
+          <p:cNvSpPr>
+            <a:spLocks noGrp="1"/>
+          </p:cNvSpPr>
+          <p:nvPr>
+            <p:ph type="ftr" sz="quarter" idx="11"/>
+          </p:nvPr>
+        </p:nvSpPr>
+        <p:spPr/>
+        <p:txBody>
+          <a:bodyPr/>
+          <a:lstStyle/>
+          <a:p>
+            <a:pPr>
+              <a:defRPr/>
+            </a:pPr>
+            <a:r>
+              <a:rPr lang="de-DE"/>
+              <a:t>Template Matching - Sven Lesche</a:t>
+            </a:r>
+            <a:endParaRPr lang="de-DE" dirty="0"/>
+          </a:p>
+        </p:txBody>
+      </p:sp>
+    </p:spTree>
+    <p:extLst>
+      <p:ext uri="{BB962C8B-B14F-4D97-AF65-F5344CB8AC3E}">
+        <p14:creationId xmlns:p14="http://schemas.microsoft.com/office/powerpoint/2010/main" val="2906963703"/>
+      </p:ext>
+    </p:extLst>
+  </p:cSld>
+  <p:clrMapOvr>
+    <a:masterClrMapping/>
+  </p:clrMapOvr>
+</p:sld>
+</file>
+
+<file path=ppt/slides/slide18.xml><?xml version="1.0" encoding="utf-8"?>
+<p:sld xmlns:a="http://schemas.openxmlformats.org/drawingml/2006/main" xmlns:r="http://schemas.openxmlformats.org/officeDocument/2006/relationships" xmlns:p="http://schemas.openxmlformats.org/presentationml/2006/main">
+  <p:cSld>
+    <p:spTree>
+      <p:nvGrpSpPr>
+        <p:cNvPr id="1" name=""/>
+        <p:cNvGrpSpPr/>
+        <p:nvPr/>
+      </p:nvGrpSpPr>
+      <p:grpSpPr>
+        <a:xfrm>
+          <a:off x="0" y="0"/>
+          <a:ext cx="0" cy="0"/>
+          <a:chOff x="0" y="0"/>
+          <a:chExt cx="0" cy="0"/>
+        </a:xfrm>
+      </p:grpSpPr>
+      <p:sp>
+        <p:nvSpPr>
+          <p:cNvPr id="2" name="Title 1">
+            <a:extLst>
+              <a:ext uri="{FF2B5EF4-FFF2-40B4-BE49-F238E27FC236}">
+                <a16:creationId xmlns:a16="http://schemas.microsoft.com/office/drawing/2014/main" id="{5324BE47-D7E2-451B-BD63-7849D2924EF2}"/>
+              </a:ext>
+            </a:extLst>
+          </p:cNvPr>
+          <p:cNvSpPr>
+            <a:spLocks noGrp="1"/>
+          </p:cNvSpPr>
+          <p:nvPr>
+            <p:ph type="title"/>
+          </p:nvPr>
+        </p:nvSpPr>
+        <p:spPr/>
+        <p:txBody>
+          <a:bodyPr/>
+          <a:lstStyle/>
+          <a:p>
+            <a:r>
+              <a:rPr lang="en-GB" dirty="0"/>
+              <a:t>Model Checks: Bias</a:t>
+            </a:r>
+          </a:p>
+        </p:txBody>
+      </p:sp>
+      <p:sp>
+        <p:nvSpPr>
+          <p:cNvPr id="4" name="Slide Number Placeholder 3">
+            <a:extLst>
+              <a:ext uri="{FF2B5EF4-FFF2-40B4-BE49-F238E27FC236}">
+                <a16:creationId xmlns:a16="http://schemas.microsoft.com/office/drawing/2014/main" id="{2616A68B-E1DE-430F-BFA1-C742BB75D719}"/>
+              </a:ext>
+            </a:extLst>
+          </p:cNvPr>
+          <p:cNvSpPr>
+            <a:spLocks noGrp="1"/>
+          </p:cNvSpPr>
+          <p:nvPr>
+            <p:ph type="sldNum" sz="quarter" idx="10"/>
+          </p:nvPr>
+        </p:nvSpPr>
+        <p:spPr/>
+        <p:txBody>
+          <a:bodyPr/>
+          <a:lstStyle/>
+          <a:p>
+            <a:pPr>
+              <a:defRPr/>
+            </a:pPr>
+            <a:fld id="{BFD7839F-DA5C-4C13-94BA-0DC1947AAA90}" type="slidenum">
+              <a:rPr lang="de-DE" altLang="de-DE" smtClean="0"/>
+              <a:pPr>
+                <a:defRPr/>
+              </a:pPr>
+              <a:t>18</a:t>
             </a:fld>
             <a:endParaRPr lang="de-DE" altLang="de-DE" dirty="0"/>
           </a:p>
@@ -9662,7 +10162,7 @@
 </p:sld>
 </file>
 
-<file path=ppt/slides/slide17.xml><?xml version="1.0" encoding="utf-8"?>
+<file path=ppt/slides/slide19.xml><?xml version="1.0" encoding="utf-8"?>
 <p:sld xmlns:a="http://schemas.openxmlformats.org/drawingml/2006/main" xmlns:r="http://schemas.openxmlformats.org/officeDocument/2006/relationships" xmlns:p="http://schemas.openxmlformats.org/presentationml/2006/main">
   <p:cSld>
     <p:spTree>
@@ -9764,7 +10264,7 @@
               <a:pPr>
                 <a:defRPr/>
               </a:pPr>
-              <a:t>17</a:t>
+              <a:t>19</a:t>
             </a:fld>
             <a:endParaRPr lang="de-DE" altLang="de-DE" dirty="0"/>
           </a:p>
@@ -9868,160 +10368,6 @@
 </p:sld>
 </file>
 
-<file path=ppt/slides/slide18.xml><?xml version="1.0" encoding="utf-8"?>
-<p:sld xmlns:a="http://schemas.openxmlformats.org/drawingml/2006/main" xmlns:r="http://schemas.openxmlformats.org/officeDocument/2006/relationships" xmlns:p="http://schemas.openxmlformats.org/presentationml/2006/main">
-  <p:cSld>
-    <p:spTree>
-      <p:nvGrpSpPr>
-        <p:cNvPr id="1" name=""/>
-        <p:cNvGrpSpPr/>
-        <p:nvPr/>
-      </p:nvGrpSpPr>
-      <p:grpSpPr>
-        <a:xfrm>
-          <a:off x="0" y="0"/>
-          <a:ext cx="0" cy="0"/>
-          <a:chOff x="0" y="0"/>
-          <a:chExt cx="0" cy="0"/>
-        </a:xfrm>
-      </p:grpSpPr>
-      <p:sp>
-        <p:nvSpPr>
-          <p:cNvPr id="2" name="Title 1">
-            <a:extLst>
-              <a:ext uri="{FF2B5EF4-FFF2-40B4-BE49-F238E27FC236}">
-                <a16:creationId xmlns:a16="http://schemas.microsoft.com/office/drawing/2014/main" id="{909B8397-FB58-47F4-A75A-B3FEEEB0FBD0}"/>
-              </a:ext>
-            </a:extLst>
-          </p:cNvPr>
-          <p:cNvSpPr>
-            <a:spLocks noGrp="1"/>
-          </p:cNvSpPr>
-          <p:nvPr>
-            <p:ph type="title"/>
-          </p:nvPr>
-        </p:nvSpPr>
-        <p:spPr/>
-        <p:txBody>
-          <a:bodyPr/>
-          <a:lstStyle/>
-          <a:p>
-            <a:r>
-              <a:rPr lang="en-GB" dirty="0"/>
-              <a:t>Model Checks: Posterior predictive checks</a:t>
-            </a:r>
-          </a:p>
-        </p:txBody>
-      </p:sp>
-      <p:pic>
-        <p:nvPicPr>
-          <p:cNvPr id="7" name="Content Placeholder 6">
-            <a:extLst>
-              <a:ext uri="{FF2B5EF4-FFF2-40B4-BE49-F238E27FC236}">
-                <a16:creationId xmlns:a16="http://schemas.microsoft.com/office/drawing/2014/main" id="{886A4F6B-1557-46B0-A3CF-736FF176A96E}"/>
-              </a:ext>
-            </a:extLst>
-          </p:cNvPr>
-          <p:cNvPicPr>
-            <a:picLocks noGrp="1" noChangeAspect="1"/>
-          </p:cNvPicPr>
-          <p:nvPr>
-            <p:ph idx="1"/>
-          </p:nvPr>
-        </p:nvPicPr>
-        <p:blipFill>
-          <a:blip r:embed="rId2"/>
-          <a:stretch>
-            <a:fillRect/>
-          </a:stretch>
-        </p:blipFill>
-        <p:spPr>
-          <a:xfrm>
-            <a:off x="215900" y="2038011"/>
-            <a:ext cx="8207375" cy="3556679"/>
-          </a:xfrm>
-        </p:spPr>
-      </p:pic>
-      <p:sp>
-        <p:nvSpPr>
-          <p:cNvPr id="4" name="Slide Number Placeholder 3">
-            <a:extLst>
-              <a:ext uri="{FF2B5EF4-FFF2-40B4-BE49-F238E27FC236}">
-                <a16:creationId xmlns:a16="http://schemas.microsoft.com/office/drawing/2014/main" id="{9E6CC409-6CDC-4854-8340-1769DC2AB3FE}"/>
-              </a:ext>
-            </a:extLst>
-          </p:cNvPr>
-          <p:cNvSpPr>
-            <a:spLocks noGrp="1"/>
-          </p:cNvSpPr>
-          <p:nvPr>
-            <p:ph type="sldNum" sz="quarter" idx="10"/>
-          </p:nvPr>
-        </p:nvSpPr>
-        <p:spPr/>
-        <p:txBody>
-          <a:bodyPr/>
-          <a:lstStyle/>
-          <a:p>
-            <a:pPr>
-              <a:defRPr/>
-            </a:pPr>
-            <a:fld id="{BFD7839F-DA5C-4C13-94BA-0DC1947AAA90}" type="slidenum">
-              <a:rPr lang="de-DE" altLang="de-DE" smtClean="0"/>
-              <a:pPr>
-                <a:defRPr/>
-              </a:pPr>
-              <a:t>18</a:t>
-            </a:fld>
-            <a:endParaRPr lang="de-DE" altLang="de-DE" dirty="0"/>
-          </a:p>
-        </p:txBody>
-      </p:sp>
-      <p:sp>
-        <p:nvSpPr>
-          <p:cNvPr id="5" name="Footer Placeholder 4">
-            <a:extLst>
-              <a:ext uri="{FF2B5EF4-FFF2-40B4-BE49-F238E27FC236}">
-                <a16:creationId xmlns:a16="http://schemas.microsoft.com/office/drawing/2014/main" id="{655BCBAA-6F20-4AC3-AE56-953734FA3F1A}"/>
-              </a:ext>
-            </a:extLst>
-          </p:cNvPr>
-          <p:cNvSpPr>
-            <a:spLocks noGrp="1"/>
-          </p:cNvSpPr>
-          <p:nvPr>
-            <p:ph type="ftr" sz="quarter" idx="11"/>
-          </p:nvPr>
-        </p:nvSpPr>
-        <p:spPr/>
-        <p:txBody>
-          <a:bodyPr/>
-          <a:lstStyle/>
-          <a:p>
-            <a:pPr>
-              <a:defRPr/>
-            </a:pPr>
-            <a:r>
-              <a:rPr lang="de-DE"/>
-              <a:t>Template Matching - Sven Lesche</a:t>
-            </a:r>
-            <a:endParaRPr lang="de-DE" dirty="0"/>
-          </a:p>
-        </p:txBody>
-      </p:sp>
-    </p:spTree>
-    <p:extLst>
-      <p:ext uri="{BB962C8B-B14F-4D97-AF65-F5344CB8AC3E}">
-        <p14:creationId xmlns:p14="http://schemas.microsoft.com/office/powerpoint/2010/main" val="1383399049"/>
-      </p:ext>
-    </p:extLst>
-  </p:cSld>
-  <p:clrMapOvr>
-    <a:masterClrMapping/>
-  </p:clrMapOvr>
-</p:sld>
-</file>
-
 <file path=ppt/slides/slide2.xml><?xml version="1.0" encoding="utf-8"?>
 <p:sld xmlns:a="http://schemas.openxmlformats.org/drawingml/2006/main" xmlns:r="http://schemas.openxmlformats.org/officeDocument/2006/relationships" xmlns:p="http://schemas.openxmlformats.org/presentationml/2006/main">
   <p:cSld>
@@ -10218,6 +10564,160 @@
     <p:extLst>
       <p:ext uri="{BB962C8B-B14F-4D97-AF65-F5344CB8AC3E}">
         <p14:creationId xmlns:p14="http://schemas.microsoft.com/office/powerpoint/2010/main" val="29258632"/>
+      </p:ext>
+    </p:extLst>
+  </p:cSld>
+  <p:clrMapOvr>
+    <a:masterClrMapping/>
+  </p:clrMapOvr>
+</p:sld>
+</file>
+
+<file path=ppt/slides/slide20.xml><?xml version="1.0" encoding="utf-8"?>
+<p:sld xmlns:a="http://schemas.openxmlformats.org/drawingml/2006/main" xmlns:r="http://schemas.openxmlformats.org/officeDocument/2006/relationships" xmlns:p="http://schemas.openxmlformats.org/presentationml/2006/main">
+  <p:cSld>
+    <p:spTree>
+      <p:nvGrpSpPr>
+        <p:cNvPr id="1" name=""/>
+        <p:cNvGrpSpPr/>
+        <p:nvPr/>
+      </p:nvGrpSpPr>
+      <p:grpSpPr>
+        <a:xfrm>
+          <a:off x="0" y="0"/>
+          <a:ext cx="0" cy="0"/>
+          <a:chOff x="0" y="0"/>
+          <a:chExt cx="0" cy="0"/>
+        </a:xfrm>
+      </p:grpSpPr>
+      <p:sp>
+        <p:nvSpPr>
+          <p:cNvPr id="2" name="Title 1">
+            <a:extLst>
+              <a:ext uri="{FF2B5EF4-FFF2-40B4-BE49-F238E27FC236}">
+                <a16:creationId xmlns:a16="http://schemas.microsoft.com/office/drawing/2014/main" id="{909B8397-FB58-47F4-A75A-B3FEEEB0FBD0}"/>
+              </a:ext>
+            </a:extLst>
+          </p:cNvPr>
+          <p:cNvSpPr>
+            <a:spLocks noGrp="1"/>
+          </p:cNvSpPr>
+          <p:nvPr>
+            <p:ph type="title"/>
+          </p:nvPr>
+        </p:nvSpPr>
+        <p:spPr/>
+        <p:txBody>
+          <a:bodyPr/>
+          <a:lstStyle/>
+          <a:p>
+            <a:r>
+              <a:rPr lang="en-GB" dirty="0"/>
+              <a:t>Model Checks: Posterior predictive checks</a:t>
+            </a:r>
+          </a:p>
+        </p:txBody>
+      </p:sp>
+      <p:pic>
+        <p:nvPicPr>
+          <p:cNvPr id="7" name="Content Placeholder 6">
+            <a:extLst>
+              <a:ext uri="{FF2B5EF4-FFF2-40B4-BE49-F238E27FC236}">
+                <a16:creationId xmlns:a16="http://schemas.microsoft.com/office/drawing/2014/main" id="{886A4F6B-1557-46B0-A3CF-736FF176A96E}"/>
+              </a:ext>
+            </a:extLst>
+          </p:cNvPr>
+          <p:cNvPicPr>
+            <a:picLocks noGrp="1" noChangeAspect="1"/>
+          </p:cNvPicPr>
+          <p:nvPr>
+            <p:ph idx="1"/>
+          </p:nvPr>
+        </p:nvPicPr>
+        <p:blipFill>
+          <a:blip r:embed="rId2"/>
+          <a:stretch>
+            <a:fillRect/>
+          </a:stretch>
+        </p:blipFill>
+        <p:spPr>
+          <a:xfrm>
+            <a:off x="215900" y="2038011"/>
+            <a:ext cx="8207375" cy="3556679"/>
+          </a:xfrm>
+        </p:spPr>
+      </p:pic>
+      <p:sp>
+        <p:nvSpPr>
+          <p:cNvPr id="4" name="Slide Number Placeholder 3">
+            <a:extLst>
+              <a:ext uri="{FF2B5EF4-FFF2-40B4-BE49-F238E27FC236}">
+                <a16:creationId xmlns:a16="http://schemas.microsoft.com/office/drawing/2014/main" id="{9E6CC409-6CDC-4854-8340-1769DC2AB3FE}"/>
+              </a:ext>
+            </a:extLst>
+          </p:cNvPr>
+          <p:cNvSpPr>
+            <a:spLocks noGrp="1"/>
+          </p:cNvSpPr>
+          <p:nvPr>
+            <p:ph type="sldNum" sz="quarter" idx="10"/>
+          </p:nvPr>
+        </p:nvSpPr>
+        <p:spPr/>
+        <p:txBody>
+          <a:bodyPr/>
+          <a:lstStyle/>
+          <a:p>
+            <a:pPr>
+              <a:defRPr/>
+            </a:pPr>
+            <a:fld id="{BFD7839F-DA5C-4C13-94BA-0DC1947AAA90}" type="slidenum">
+              <a:rPr lang="de-DE" altLang="de-DE" smtClean="0"/>
+              <a:pPr>
+                <a:defRPr/>
+              </a:pPr>
+              <a:t>20</a:t>
+            </a:fld>
+            <a:endParaRPr lang="de-DE" altLang="de-DE" dirty="0"/>
+          </a:p>
+        </p:txBody>
+      </p:sp>
+      <p:sp>
+        <p:nvSpPr>
+          <p:cNvPr id="5" name="Footer Placeholder 4">
+            <a:extLst>
+              <a:ext uri="{FF2B5EF4-FFF2-40B4-BE49-F238E27FC236}">
+                <a16:creationId xmlns:a16="http://schemas.microsoft.com/office/drawing/2014/main" id="{655BCBAA-6F20-4AC3-AE56-953734FA3F1A}"/>
+              </a:ext>
+            </a:extLst>
+          </p:cNvPr>
+          <p:cNvSpPr>
+            <a:spLocks noGrp="1"/>
+          </p:cNvSpPr>
+          <p:nvPr>
+            <p:ph type="ftr" sz="quarter" idx="11"/>
+          </p:nvPr>
+        </p:nvSpPr>
+        <p:spPr/>
+        <p:txBody>
+          <a:bodyPr/>
+          <a:lstStyle/>
+          <a:p>
+            <a:pPr>
+              <a:defRPr/>
+            </a:pPr>
+            <a:r>
+              <a:rPr lang="de-DE"/>
+              <a:t>Template Matching - Sven Lesche</a:t>
+            </a:r>
+            <a:endParaRPr lang="de-DE" dirty="0"/>
+          </a:p>
+        </p:txBody>
+      </p:sp>
+    </p:spTree>
+    <p:extLst>
+      <p:ext uri="{BB962C8B-B14F-4D97-AF65-F5344CB8AC3E}">
+        <p14:creationId xmlns:p14="http://schemas.microsoft.com/office/powerpoint/2010/main" val="1383399049"/>
       </p:ext>
     </p:extLst>
   </p:cSld>
@@ -11074,7 +11574,7 @@
           <a:bodyPr/>
           <a:lstStyle/>
           <a:p>
-            <a:endParaRPr lang="en-GB"/>
+            <a:endParaRPr lang="en-GB" dirty="0"/>
           </a:p>
         </p:txBody>
       </p:sp>
@@ -11180,7 +11680,7 @@
           <p:cNvPr id="2" name="Title 1">
             <a:extLst>
               <a:ext uri="{FF2B5EF4-FFF2-40B4-BE49-F238E27FC236}">
-                <a16:creationId xmlns:a16="http://schemas.microsoft.com/office/drawing/2014/main" id="{366B0929-4D63-4935-BC68-DCEE86A5F21C}"/>
+                <a16:creationId xmlns:a16="http://schemas.microsoft.com/office/drawing/2014/main" id="{E7C9B57E-0726-42F0-AAE8-935D9DC27331}"/>
               </a:ext>
             </a:extLst>
           </p:cNvPr>
@@ -11197,13 +11697,34 @@
           <a:lstStyle/>
           <a:p>
             <a:r>
-              <a:rPr lang="en-GB" dirty="0" err="1"/>
-              <a:t>Ergebnisse</a:t>
-            </a:r>
-            <a:r>
               <a:rPr lang="en-GB" dirty="0"/>
-              <a:t> </a:t>
-            </a:r>
+              <a:t>Bayes Flow</a:t>
+            </a:r>
+          </a:p>
+        </p:txBody>
+      </p:sp>
+      <p:sp>
+        <p:nvSpPr>
+          <p:cNvPr id="3" name="Content Placeholder 2">
+            <a:extLst>
+              <a:ext uri="{FF2B5EF4-FFF2-40B4-BE49-F238E27FC236}">
+                <a16:creationId xmlns:a16="http://schemas.microsoft.com/office/drawing/2014/main" id="{BE7AF9FE-44D9-40CB-9EAD-4F3623429394}"/>
+              </a:ext>
+            </a:extLst>
+          </p:cNvPr>
+          <p:cNvSpPr>
+            <a:spLocks noGrp="1"/>
+          </p:cNvSpPr>
+          <p:nvPr>
+            <p:ph idx="1"/>
+          </p:nvPr>
+        </p:nvSpPr>
+        <p:spPr/>
+        <p:txBody>
+          <a:bodyPr/>
+          <a:lstStyle/>
+          <a:p>
+            <a:endParaRPr lang="en-GB"/>
           </a:p>
         </p:txBody>
       </p:sp>
@@ -11212,7 +11733,7 @@
           <p:cNvPr id="4" name="Slide Number Placeholder 3">
             <a:extLst>
               <a:ext uri="{FF2B5EF4-FFF2-40B4-BE49-F238E27FC236}">
-                <a16:creationId xmlns:a16="http://schemas.microsoft.com/office/drawing/2014/main" id="{507D79C0-B13A-4F87-AD41-A3FA70F2F4C9}"/>
+                <a16:creationId xmlns:a16="http://schemas.microsoft.com/office/drawing/2014/main" id="{7357BEDF-AD71-427F-9438-410198708D62}"/>
               </a:ext>
             </a:extLst>
           </p:cNvPr>
@@ -11247,7 +11768,7 @@
           <p:cNvPr id="5" name="Footer Placeholder 4">
             <a:extLst>
               <a:ext uri="{FF2B5EF4-FFF2-40B4-BE49-F238E27FC236}">
-                <a16:creationId xmlns:a16="http://schemas.microsoft.com/office/drawing/2014/main" id="{52446E38-697D-4461-B232-3CD9B85209A9}"/>
+                <a16:creationId xmlns:a16="http://schemas.microsoft.com/office/drawing/2014/main" id="{ED0A1FDA-99F9-4005-8C63-285F4512DEB0}"/>
               </a:ext>
             </a:extLst>
           </p:cNvPr>
@@ -11274,45 +11795,10 @@
           </a:p>
         </p:txBody>
       </p:sp>
-      <p:pic>
-        <p:nvPicPr>
-          <p:cNvPr id="10" name="Content Placeholder 9">
-            <a:extLst>
-              <a:ext uri="{FF2B5EF4-FFF2-40B4-BE49-F238E27FC236}">
-                <a16:creationId xmlns:a16="http://schemas.microsoft.com/office/drawing/2014/main" id="{7AD23912-C7E9-4B57-B56A-96214EE9CC3E}"/>
-              </a:ext>
-            </a:extLst>
-          </p:cNvPr>
-          <p:cNvPicPr>
-            <a:picLocks noGrp="1" noChangeAspect="1"/>
-          </p:cNvPicPr>
-          <p:nvPr>
-            <p:ph idx="1"/>
-          </p:nvPr>
-        </p:nvPicPr>
-        <p:blipFill>
-          <a:blip r:embed="rId2">
-            <a:extLst>
-              <a:ext uri="{28A0092B-C50C-407E-A947-70E740481C1C}">
-                <a14:useLocalDpi xmlns:a14="http://schemas.microsoft.com/office/drawing/2010/main" val="0"/>
-              </a:ext>
-            </a:extLst>
-          </a:blip>
-          <a:stretch>
-            <a:fillRect/>
-          </a:stretch>
-        </p:blipFill>
-        <p:spPr>
-          <a:xfrm>
-            <a:off x="215900" y="1845022"/>
-            <a:ext cx="8207375" cy="3942656"/>
-          </a:xfrm>
-        </p:spPr>
-      </p:pic>
     </p:spTree>
     <p:extLst>
       <p:ext uri="{BB962C8B-B14F-4D97-AF65-F5344CB8AC3E}">
-        <p14:creationId xmlns:p14="http://schemas.microsoft.com/office/powerpoint/2010/main" val="238607183"/>
+        <p14:creationId xmlns:p14="http://schemas.microsoft.com/office/powerpoint/2010/main" val="4145911233"/>
       </p:ext>
     </p:extLst>
   </p:cSld>

</xml_diff>